<commit_message>
Error Tags implemented, now able to close on [x]
</commit_message>
<xml_diff>
--- a/Test/Test.pptx
+++ b/Test/Test.pptx
@@ -289,7 +289,7 @@
             <a:fld id="{1BA50D42-C9CD-4801-B293-61D1F53EC57E}" type="datetimeFigureOut">
               <a:rPr lang="de-DE" smtClean="0"/>
               <a:pPr/>
-              <a:t>28.08.2015</a:t>
+              <a:t>31.08.2015</a:t>
             </a:fld>
             <a:endParaRPr lang="de-DE"/>
           </a:p>
@@ -456,7 +456,7 @@
             <a:fld id="{1BA50D42-C9CD-4801-B293-61D1F53EC57E}" type="datetimeFigureOut">
               <a:rPr lang="de-DE" smtClean="0"/>
               <a:pPr/>
-              <a:t>28.08.2015</a:t>
+              <a:t>31.08.2015</a:t>
             </a:fld>
             <a:endParaRPr lang="de-DE"/>
           </a:p>
@@ -633,7 +633,7 @@
             <a:fld id="{1BA50D42-C9CD-4801-B293-61D1F53EC57E}" type="datetimeFigureOut">
               <a:rPr lang="de-DE" smtClean="0"/>
               <a:pPr/>
-              <a:t>28.08.2015</a:t>
+              <a:t>31.08.2015</a:t>
             </a:fld>
             <a:endParaRPr lang="de-DE"/>
           </a:p>
@@ -800,7 +800,7 @@
             <a:fld id="{1BA50D42-C9CD-4801-B293-61D1F53EC57E}" type="datetimeFigureOut">
               <a:rPr lang="de-DE" smtClean="0"/>
               <a:pPr/>
-              <a:t>28.08.2015</a:t>
+              <a:t>31.08.2015</a:t>
             </a:fld>
             <a:endParaRPr lang="de-DE"/>
           </a:p>
@@ -1043,7 +1043,7 @@
             <a:fld id="{1BA50D42-C9CD-4801-B293-61D1F53EC57E}" type="datetimeFigureOut">
               <a:rPr lang="de-DE" smtClean="0"/>
               <a:pPr/>
-              <a:t>28.08.2015</a:t>
+              <a:t>31.08.2015</a:t>
             </a:fld>
             <a:endParaRPr lang="de-DE"/>
           </a:p>
@@ -1328,7 +1328,7 @@
             <a:fld id="{1BA50D42-C9CD-4801-B293-61D1F53EC57E}" type="datetimeFigureOut">
               <a:rPr lang="de-DE" smtClean="0"/>
               <a:pPr/>
-              <a:t>28.08.2015</a:t>
+              <a:t>31.08.2015</a:t>
             </a:fld>
             <a:endParaRPr lang="de-DE"/>
           </a:p>
@@ -1747,7 +1747,7 @@
             <a:fld id="{1BA50D42-C9CD-4801-B293-61D1F53EC57E}" type="datetimeFigureOut">
               <a:rPr lang="de-DE" smtClean="0"/>
               <a:pPr/>
-              <a:t>28.08.2015</a:t>
+              <a:t>31.08.2015</a:t>
             </a:fld>
             <a:endParaRPr lang="de-DE"/>
           </a:p>
@@ -1862,7 +1862,7 @@
             <a:fld id="{1BA50D42-C9CD-4801-B293-61D1F53EC57E}" type="datetimeFigureOut">
               <a:rPr lang="de-DE" smtClean="0"/>
               <a:pPr/>
-              <a:t>28.08.2015</a:t>
+              <a:t>31.08.2015</a:t>
             </a:fld>
             <a:endParaRPr lang="de-DE"/>
           </a:p>
@@ -1954,7 +1954,7 @@
             <a:fld id="{1BA50D42-C9CD-4801-B293-61D1F53EC57E}" type="datetimeFigureOut">
               <a:rPr lang="de-DE" smtClean="0"/>
               <a:pPr/>
-              <a:t>28.08.2015</a:t>
+              <a:t>31.08.2015</a:t>
             </a:fld>
             <a:endParaRPr lang="de-DE"/>
           </a:p>
@@ -2228,7 +2228,7 @@
             <a:fld id="{1BA50D42-C9CD-4801-B293-61D1F53EC57E}" type="datetimeFigureOut">
               <a:rPr lang="de-DE" smtClean="0"/>
               <a:pPr/>
-              <a:t>28.08.2015</a:t>
+              <a:t>31.08.2015</a:t>
             </a:fld>
             <a:endParaRPr lang="de-DE"/>
           </a:p>
@@ -2478,7 +2478,7 @@
             <a:fld id="{1BA50D42-C9CD-4801-B293-61D1F53EC57E}" type="datetimeFigureOut">
               <a:rPr lang="de-DE" smtClean="0"/>
               <a:pPr/>
-              <a:t>28.08.2015</a:t>
+              <a:t>31.08.2015</a:t>
             </a:fld>
             <a:endParaRPr lang="de-DE"/>
           </a:p>
@@ -2688,7 +2688,7 @@
             <a:fld id="{1BA50D42-C9CD-4801-B293-61D1F53EC57E}" type="datetimeFigureOut">
               <a:rPr lang="de-DE" smtClean="0"/>
               <a:pPr/>
-              <a:t>28.08.2015</a:t>
+              <a:t>31.08.2015</a:t>
             </a:fld>
             <a:endParaRPr lang="de-DE"/>
           </a:p>

</xml_diff>

<commit_message>
Allowing doubleclick in user forms
</commit_message>
<xml_diff>
--- a/Test/Test.pptx
+++ b/Test/Test.pptx
@@ -3076,7 +3076,7 @@
           <a:p>
             <a:r>
               <a:rPr lang="de-DE" smtClean="0"/>
-              <a:t>EnglishHeading</a:t>
+              <a:t>Deutsche Überschrift</a:t>
             </a:r>
             <a:endParaRPr lang="de-DE" dirty="0"/>
           </a:p>
@@ -3099,8 +3099,8 @@
           <a:p>
             <a:r>
               <a:rPr lang="de-DE" smtClean="0"/>
-              <a:t>English Text
-Line 2</a:t>
+              <a:t>Deutscher Text
+Zeile 2</a:t>
             </a:r>
             <a:endParaRPr lang="de-DE" dirty="0"/>
           </a:p>

</xml_diff>

<commit_message>
Handler now restart consistent. started bulleting started config
</commit_message>
<xml_diff>
--- a/Test/Test.pptx
+++ b/Test/Test.pptx
@@ -9,6 +9,9 @@
   </p:sldIdLst>
   <p:sldSz cx="9144000" cy="6858000" type="screen4x3"/>
   <p:notesSz cx="6858000" cy="9144000"/>
+  <p:custDataLst>
+    <p:tags r:id="rId3"/>
+  </p:custDataLst>
   <p:defaultTextStyle>
     <a:defPPr>
       <a:defRPr lang="de-DE"/>
@@ -289,7 +292,7 @@
             <a:fld id="{1BA50D42-C9CD-4801-B293-61D1F53EC57E}" type="datetimeFigureOut">
               <a:rPr lang="de-DE" smtClean="0"/>
               <a:pPr/>
-              <a:t>31.08.2015</a:t>
+              <a:t>07.09.2015</a:t>
             </a:fld>
             <a:endParaRPr lang="de-DE"/>
           </a:p>
@@ -456,7 +459,7 @@
             <a:fld id="{1BA50D42-C9CD-4801-B293-61D1F53EC57E}" type="datetimeFigureOut">
               <a:rPr lang="de-DE" smtClean="0"/>
               <a:pPr/>
-              <a:t>31.08.2015</a:t>
+              <a:t>07.09.2015</a:t>
             </a:fld>
             <a:endParaRPr lang="de-DE"/>
           </a:p>
@@ -633,7 +636,7 @@
             <a:fld id="{1BA50D42-C9CD-4801-B293-61D1F53EC57E}" type="datetimeFigureOut">
               <a:rPr lang="de-DE" smtClean="0"/>
               <a:pPr/>
-              <a:t>31.08.2015</a:t>
+              <a:t>07.09.2015</a:t>
             </a:fld>
             <a:endParaRPr lang="de-DE"/>
           </a:p>
@@ -800,7 +803,7 @@
             <a:fld id="{1BA50D42-C9CD-4801-B293-61D1F53EC57E}" type="datetimeFigureOut">
               <a:rPr lang="de-DE" smtClean="0"/>
               <a:pPr/>
-              <a:t>31.08.2015</a:t>
+              <a:t>07.09.2015</a:t>
             </a:fld>
             <a:endParaRPr lang="de-DE"/>
           </a:p>
@@ -1043,7 +1046,7 @@
             <a:fld id="{1BA50D42-C9CD-4801-B293-61D1F53EC57E}" type="datetimeFigureOut">
               <a:rPr lang="de-DE" smtClean="0"/>
               <a:pPr/>
-              <a:t>31.08.2015</a:t>
+              <a:t>07.09.2015</a:t>
             </a:fld>
             <a:endParaRPr lang="de-DE"/>
           </a:p>
@@ -1328,7 +1331,7 @@
             <a:fld id="{1BA50D42-C9CD-4801-B293-61D1F53EC57E}" type="datetimeFigureOut">
               <a:rPr lang="de-DE" smtClean="0"/>
               <a:pPr/>
-              <a:t>31.08.2015</a:t>
+              <a:t>07.09.2015</a:t>
             </a:fld>
             <a:endParaRPr lang="de-DE"/>
           </a:p>
@@ -1747,7 +1750,7 @@
             <a:fld id="{1BA50D42-C9CD-4801-B293-61D1F53EC57E}" type="datetimeFigureOut">
               <a:rPr lang="de-DE" smtClean="0"/>
               <a:pPr/>
-              <a:t>31.08.2015</a:t>
+              <a:t>07.09.2015</a:t>
             </a:fld>
             <a:endParaRPr lang="de-DE"/>
           </a:p>
@@ -1862,7 +1865,7 @@
             <a:fld id="{1BA50D42-C9CD-4801-B293-61D1F53EC57E}" type="datetimeFigureOut">
               <a:rPr lang="de-DE" smtClean="0"/>
               <a:pPr/>
-              <a:t>31.08.2015</a:t>
+              <a:t>07.09.2015</a:t>
             </a:fld>
             <a:endParaRPr lang="de-DE"/>
           </a:p>
@@ -1954,7 +1957,7 @@
             <a:fld id="{1BA50D42-C9CD-4801-B293-61D1F53EC57E}" type="datetimeFigureOut">
               <a:rPr lang="de-DE" smtClean="0"/>
               <a:pPr/>
-              <a:t>31.08.2015</a:t>
+              <a:t>07.09.2015</a:t>
             </a:fld>
             <a:endParaRPr lang="de-DE"/>
           </a:p>
@@ -2228,7 +2231,7 @@
             <a:fld id="{1BA50D42-C9CD-4801-B293-61D1F53EC57E}" type="datetimeFigureOut">
               <a:rPr lang="de-DE" smtClean="0"/>
               <a:pPr/>
-              <a:t>31.08.2015</a:t>
+              <a:t>07.09.2015</a:t>
             </a:fld>
             <a:endParaRPr lang="de-DE"/>
           </a:p>
@@ -2478,7 +2481,7 @@
             <a:fld id="{1BA50D42-C9CD-4801-B293-61D1F53EC57E}" type="datetimeFigureOut">
               <a:rPr lang="de-DE" smtClean="0"/>
               <a:pPr/>
-              <a:t>31.08.2015</a:t>
+              <a:t>07.09.2015</a:t>
             </a:fld>
             <a:endParaRPr lang="de-DE"/>
           </a:p>
@@ -2688,7 +2691,7 @@
             <a:fld id="{1BA50D42-C9CD-4801-B293-61D1F53EC57E}" type="datetimeFigureOut">
               <a:rPr lang="de-DE" smtClean="0"/>
               <a:pPr/>
-              <a:t>31.08.2015</a:t>
+              <a:t>07.09.2015</a:t>
             </a:fld>
             <a:endParaRPr lang="de-DE"/>
           </a:p>
@@ -3074,11 +3077,24 @@
           <a:bodyPr/>
           <a:lstStyle/>
           <a:p>
-            <a:r>
-              <a:rPr lang="de-DE" smtClean="0"/>
+            <a:pPr marL="742950" indent="-742950">
+              <a:buAutoNum type="arabicPeriod"/>
+            </a:pPr>
+            <a:r>
+              <a:rPr lang="de-DE" smtClean="0">
+                <a:solidFill>
+                  <a:srgbClr val="000000"/>
+                </a:solidFill>
+                <a:latin typeface="Calibri"/>
+              </a:rPr>
               <a:t>Deutsche Überschrift</a:t>
             </a:r>
-            <a:endParaRPr lang="de-DE" dirty="0"/>
+            <a:endParaRPr lang="de-DE" dirty="0">
+              <a:solidFill>
+                <a:srgbClr val="000000"/>
+              </a:solidFill>
+              <a:latin typeface="Calibri"/>
+            </a:endParaRPr>
           </a:p>
         </p:txBody>
       </p:sp>
@@ -3097,12 +3113,88 @@
           <a:bodyPr/>
           <a:lstStyle/>
           <a:p>
-            <a:r>
-              <a:rPr lang="de-DE" smtClean="0"/>
-              <a:t>Deutscher Text
-Zeile 2</a:t>
-            </a:r>
-            <a:endParaRPr lang="de-DE" dirty="0"/>
+            <a:pPr marL="514350" indent="-514350">
+              <a:buFont typeface="Arial" pitchFamily="34" charset="0"/>
+              <a:buAutoNum type="arabicPeriod"/>
+            </a:pPr>
+            <a:r>
+              <a:rPr lang="de-DE" b="1" u="sng" smtClean="0">
+                <a:solidFill>
+                  <a:srgbClr val="00B0F0"/>
+                </a:solidFill>
+                <a:latin typeface="Calibri"/>
+              </a:rPr>
+              <a:t>qweqweqwe</a:t>
+            </a:r>
+            <a:r>
+              <a:rPr lang="de-DE" smtClean="0">
+                <a:solidFill>
+                  <a:srgbClr val="898989"/>
+                </a:solidFill>
+                <a:latin typeface="Calibri"/>
+              </a:rPr>
+              <a:t>Asdq</a:t>
+            </a:r>
+            <a:r>
+              <a:rPr lang="de-DE" b="1" i="1" smtClean="0">
+                <a:solidFill>
+                  <a:srgbClr val="898989"/>
+                </a:solidFill>
+                <a:latin typeface="Calibri"/>
+              </a:rPr>
+              <a:t>weq</a:t>
+            </a:r>
+            <a:r>
+              <a:rPr lang="de-DE" smtClean="0">
+                <a:solidFill>
+                  <a:srgbClr val="898989"/>
+                </a:solidFill>
+                <a:latin typeface="Calibri"/>
+              </a:rPr>
+              <a:t>weD</a:t>
+            </a:r>
+            <a:r>
+              <a:rPr lang="de-DE" smtClean="0">
+                <a:solidFill>
+                  <a:srgbClr val="FF0000"/>
+                </a:solidFill>
+                <a:latin typeface="Calibri"/>
+              </a:rPr>
+              <a:t>eutsch</a:t>
+            </a:r>
+            <a:r>
+              <a:rPr lang="de-DE" smtClean="0">
+                <a:solidFill>
+                  <a:srgbClr val="898989"/>
+                </a:solidFill>
+                <a:latin typeface="Calibri"/>
+              </a:rPr>
+              <a:t>er Text</a:t>
+            </a:r>
+            <a:r>
+              <a:rPr lang="de-DE" smtClean="0">
+                <a:solidFill>
+                  <a:srgbClr val="FFFF00"/>
+                </a:solidFill>
+                <a:latin typeface="Calibri"/>
+              </a:rPr>
+              <a:t>Zeile 2</a:t>
+            </a:r>
+            <a:r>
+              <a:rPr lang="de-DE" smtClean="0">
+                <a:solidFill>
+                  <a:srgbClr val="898989"/>
+                </a:solidFill>
+                <a:latin typeface="Calibri"/>
+              </a:rPr>
+              <a:t>qweqwe</a:t>
+            </a:r>
+            <a:endParaRPr lang="de-DE" dirty="0">
+              <a:solidFill>
+                <a:srgbClr val="898989"/>
+              </a:solidFill>
+              <a:latin typeface="Calibri"/>
+            </a:endParaRPr>
           </a:p>
         </p:txBody>
       </p:sp>
@@ -3112,6 +3204,12 @@
     <a:masterClrMapping/>
   </p:clrMapOvr>
 </p:sld>
+</file>
+
+<file path=ppt/tags/tag1.xml><?xml version="1.0" encoding="utf-8"?>
+<p:tagLst xmlns:a="http://schemas.openxmlformats.org/drawingml/2006/main" xmlns:r="http://schemas.openxmlformats.org/officeDocument/2006/relationships" xmlns:p="http://schemas.openxmlformats.org/presentationml/2006/main">
+  <p:tag name="LGMANAGER_LOADHANDLERONSTART" val="false"/>
+</p:tagLst>
 </file>
 
 <file path=ppt/theme/theme1.xml><?xml version="1.0" encoding="utf-8"?>

</xml_diff>

<commit_message>
changes to user interface better error cases
</commit_message>
<xml_diff>
--- a/Test/Test.pptx
+++ b/Test/Test.pptx
@@ -3087,7 +3087,7 @@
                 </a:solidFill>
                 <a:latin typeface="Calibri"/>
               </a:rPr>
-              <a:t>Deutsche Überschrift</a:t>
+              <a:t>eee</a:t>
             </a:r>
             <a:endParaRPr lang="de-DE" dirty="0">
               <a:solidFill>
@@ -3208,7 +3208,7 @@
 
 <file path=ppt/tags/tag1.xml><?xml version="1.0" encoding="utf-8"?>
 <p:tagLst xmlns:a="http://schemas.openxmlformats.org/drawingml/2006/main" xmlns:r="http://schemas.openxmlformats.org/officeDocument/2006/relationships" xmlns:p="http://schemas.openxmlformats.org/presentationml/2006/main">
-  <p:tag name="LGMANAGER_LOADHANDLERONSTART" val="false"/>
+  <p:tag name="LGMANAGER_LOADHANDLERONSTART" val="true"/>
 </p:tagLst>
 </file>
 

</xml_diff>